<commit_message>
Update Week 11 Software Testing.pptx
</commit_message>
<xml_diff>
--- a/Slides/Week 11 Software Testing.pptx
+++ b/Slides/Week 11 Software Testing.pptx
@@ -240,7 +240,7 @@
           <a:p>
             <a:fld id="{0FEC1AAB-5E7C-43B3-93F1-3B00C2708E32}" type="datetimeFigureOut">
               <a:rPr lang="th-TH" smtClean="0"/>
-              <a:t>05/11/61</a:t>
+              <a:t>25/10/62</a:t>
             </a:fld>
             <a:endParaRPr lang="th-TH"/>
           </a:p>
@@ -418,7 +418,7 @@
           <a:p>
             <a:fld id="{5B1B5456-0566-42F4-BCC8-DF5300E15663}" type="datetimeFigureOut">
               <a:rPr lang="th-TH" smtClean="0"/>
-              <a:t>05/11/61</a:t>
+              <a:t>25/10/62</a:t>
             </a:fld>
             <a:endParaRPr lang="th-TH"/>
           </a:p>
@@ -7400,7 +7400,7 @@
           <a:p>
             <a:r>
               <a:rPr lang="th-TH"/>
-              <a:t>2561.11.06</a:t>
+              <a:t>2562.10.25</a:t>
             </a:r>
           </a:p>
         </p:txBody>
@@ -7573,7 +7573,7 @@
           <a:p>
             <a:r>
               <a:rPr lang="th-TH"/>
-              <a:t>2561.11.06</a:t>
+              <a:t>2562.10.25</a:t>
             </a:r>
           </a:p>
         </p:txBody>
@@ -7756,7 +7756,7 @@
           <a:p>
             <a:r>
               <a:rPr lang="th-TH"/>
-              <a:t>2561.11.06</a:t>
+              <a:t>2562.10.25</a:t>
             </a:r>
           </a:p>
         </p:txBody>
@@ -7994,7 +7994,7 @@
           <a:p>
             <a:r>
               <a:rPr lang="th-TH"/>
-              <a:t>2561.11.06</a:t>
+              <a:t>2562.10.25</a:t>
             </a:r>
             <a:endParaRPr lang="th-TH" dirty="0"/>
           </a:p>
@@ -8265,7 +8265,7 @@
           <a:p>
             <a:r>
               <a:rPr lang="th-TH"/>
-              <a:t>2561.11.06</a:t>
+              <a:t>2562.10.25</a:t>
             </a:r>
           </a:p>
         </p:txBody>
@@ -8506,7 +8506,7 @@
           <a:p>
             <a:r>
               <a:rPr lang="th-TH"/>
-              <a:t>2561.11.06</a:t>
+              <a:t>2562.10.25</a:t>
             </a:r>
           </a:p>
         </p:txBody>
@@ -8876,7 +8876,7 @@
           <a:p>
             <a:r>
               <a:rPr lang="th-TH"/>
-              <a:t>2561.11.06</a:t>
+              <a:t>2562.10.25</a:t>
             </a:r>
           </a:p>
         </p:txBody>
@@ -9002,7 +9002,7 @@
           <a:p>
             <a:r>
               <a:rPr lang="th-TH"/>
-              <a:t>2561.11.06</a:t>
+              <a:t>2562.10.25</a:t>
             </a:r>
           </a:p>
         </p:txBody>
@@ -9100,7 +9100,7 @@
           <a:p>
             <a:r>
               <a:rPr lang="th-TH"/>
-              <a:t>2561.11.06</a:t>
+              <a:t>2562.10.25</a:t>
             </a:r>
           </a:p>
         </p:txBody>
@@ -9380,7 +9380,7 @@
           <a:p>
             <a:r>
               <a:rPr lang="th-TH"/>
-              <a:t>2561.11.06</a:t>
+              <a:t>2562.10.25</a:t>
             </a:r>
           </a:p>
         </p:txBody>
@@ -9640,7 +9640,7 @@
           <a:p>
             <a:r>
               <a:rPr lang="th-TH"/>
-              <a:t>2561.11.06</a:t>
+              <a:t>2562.10.25</a:t>
             </a:r>
           </a:p>
         </p:txBody>
@@ -9856,7 +9856,7 @@
           <a:p>
             <a:r>
               <a:rPr lang="th-TH"/>
-              <a:t>2561.11.06</a:t>
+              <a:t>2562.10.25</a:t>
             </a:r>
           </a:p>
         </p:txBody>
@@ -10735,7 +10735,7 @@
           <a:p>
             <a:r>
               <a:rPr lang="th-TH"/>
-              <a:t>2561.11.06</a:t>
+              <a:t>2562.10.25</a:t>
             </a:r>
             <a:endParaRPr lang="th-TH" dirty="0"/>
           </a:p>
@@ -10931,7 +10931,7 @@
           <a:p>
             <a:r>
               <a:rPr lang="th-TH"/>
-              <a:t>2561.11.06</a:t>
+              <a:t>2562.10.25</a:t>
             </a:r>
             <a:endParaRPr lang="th-TH" dirty="0"/>
           </a:p>
@@ -11245,7 +11245,7 @@
           <a:p>
             <a:r>
               <a:rPr lang="th-TH"/>
-              <a:t>2561.11.06</a:t>
+              <a:t>2562.10.25</a:t>
             </a:r>
             <a:endParaRPr lang="th-TH" dirty="0"/>
           </a:p>
@@ -11578,7 +11578,7 @@
           <a:p>
             <a:r>
               <a:rPr lang="th-TH"/>
-              <a:t>2561.11.06</a:t>
+              <a:t>2562.10.25</a:t>
             </a:r>
             <a:endParaRPr lang="th-TH" dirty="0"/>
           </a:p>
@@ -11927,7 +11927,7 @@
           <a:p>
             <a:r>
               <a:rPr lang="th-TH"/>
-              <a:t>2561.11.06</a:t>
+              <a:t>2562.10.25</a:t>
             </a:r>
             <a:endParaRPr lang="th-TH" dirty="0"/>
           </a:p>
@@ -12123,7 +12123,7 @@
           <a:p>
             <a:r>
               <a:rPr lang="th-TH"/>
-              <a:t>2561.11.06</a:t>
+              <a:t>2562.10.25</a:t>
             </a:r>
             <a:endParaRPr lang="th-TH" dirty="0"/>
           </a:p>
@@ -12425,7 +12425,7 @@
           <a:p>
             <a:r>
               <a:rPr lang="th-TH"/>
-              <a:t>2561.11.06</a:t>
+              <a:t>2562.10.25</a:t>
             </a:r>
             <a:endParaRPr lang="th-TH" dirty="0"/>
           </a:p>
@@ -12580,7 +12580,7 @@
           <a:p>
             <a:r>
               <a:rPr lang="th-TH"/>
-              <a:t>2561.11.06</a:t>
+              <a:t>2562.10.25</a:t>
             </a:r>
             <a:endParaRPr lang="th-TH" dirty="0"/>
           </a:p>
@@ -13062,7 +13062,7 @@
           <a:p>
             <a:r>
               <a:rPr lang="th-TH"/>
-              <a:t>2561.11.06</a:t>
+              <a:t>2562.10.25</a:t>
             </a:r>
             <a:endParaRPr lang="th-TH" dirty="0"/>
           </a:p>
@@ -13441,7 +13441,7 @@
           <a:p>
             <a:r>
               <a:rPr lang="th-TH"/>
-              <a:t>2561.11.06</a:t>
+              <a:t>2562.10.25</a:t>
             </a:r>
             <a:endParaRPr lang="th-TH" dirty="0"/>
           </a:p>
@@ -13661,7 +13661,7 @@
           <a:p>
             <a:r>
               <a:rPr lang="th-TH"/>
-              <a:t>2561.11.06</a:t>
+              <a:t>2562.10.25</a:t>
             </a:r>
             <a:endParaRPr lang="th-TH" dirty="0"/>
           </a:p>
@@ -13996,7 +13996,7 @@
           <a:p>
             <a:r>
               <a:rPr lang="th-TH"/>
-              <a:t>2561.11.06</a:t>
+              <a:t>2562.10.25</a:t>
             </a:r>
             <a:endParaRPr lang="th-TH" dirty="0"/>
           </a:p>
@@ -14192,7 +14192,7 @@
           <a:p>
             <a:r>
               <a:rPr lang="th-TH"/>
-              <a:t>2561.11.06</a:t>
+              <a:t>2562.10.25</a:t>
             </a:r>
             <a:endParaRPr lang="th-TH" dirty="0"/>
           </a:p>
@@ -14548,7 +14548,7 @@
           <a:p>
             <a:r>
               <a:rPr lang="th-TH"/>
-              <a:t>2561.11.06</a:t>
+              <a:t>2562.10.25</a:t>
             </a:r>
             <a:endParaRPr lang="th-TH" dirty="0"/>
           </a:p>
@@ -14926,7 +14926,7 @@
           <a:p>
             <a:r>
               <a:rPr lang="th-TH"/>
-              <a:t>2561.11.06</a:t>
+              <a:t>2562.10.25</a:t>
             </a:r>
             <a:endParaRPr lang="th-TH" dirty="0"/>
           </a:p>
@@ -15369,7 +15369,7 @@
           <a:p>
             <a:r>
               <a:rPr lang="th-TH"/>
-              <a:t>2561.11.06</a:t>
+              <a:t>2562.10.25</a:t>
             </a:r>
             <a:endParaRPr lang="th-TH" dirty="0"/>
           </a:p>
@@ -15824,7 +15824,7 @@
           <a:p>
             <a:r>
               <a:rPr lang="th-TH"/>
-              <a:t>2561.11.06</a:t>
+              <a:t>2562.10.25</a:t>
             </a:r>
             <a:endParaRPr lang="th-TH" dirty="0"/>
           </a:p>
@@ -16151,7 +16151,7 @@
           <a:p>
             <a:r>
               <a:rPr lang="th-TH"/>
-              <a:t>2561.11.06</a:t>
+              <a:t>2562.10.25</a:t>
             </a:r>
             <a:endParaRPr lang="th-TH" dirty="0"/>
           </a:p>
@@ -16486,7 +16486,7 @@
           <a:p>
             <a:r>
               <a:rPr lang="th-TH"/>
-              <a:t>2561.11.06</a:t>
+              <a:t>2562.10.25</a:t>
             </a:r>
             <a:endParaRPr lang="th-TH" dirty="0"/>
           </a:p>
@@ -16650,7 +16650,7 @@
           <a:p>
             <a:r>
               <a:rPr lang="th-TH"/>
-              <a:t>2561.11.06</a:t>
+              <a:t>2562.10.25</a:t>
             </a:r>
             <a:endParaRPr lang="th-TH" dirty="0"/>
           </a:p>
@@ -16876,7 +16876,7 @@
           <a:p>
             <a:r>
               <a:rPr lang="th-TH"/>
-              <a:t>2561.11.06</a:t>
+              <a:t>2562.10.25</a:t>
             </a:r>
             <a:endParaRPr lang="th-TH" dirty="0"/>
           </a:p>
@@ -17164,7 +17164,7 @@
           <a:p>
             <a:r>
               <a:rPr lang="th-TH"/>
-              <a:t>2561.11.06</a:t>
+              <a:t>2562.10.25</a:t>
             </a:r>
             <a:endParaRPr lang="th-TH" dirty="0"/>
           </a:p>
@@ -17465,7 +17465,7 @@
           <a:p>
             <a:r>
               <a:rPr lang="th-TH"/>
-              <a:t>2561.11.06</a:t>
+              <a:t>2562.10.25</a:t>
             </a:r>
             <a:endParaRPr lang="th-TH" dirty="0"/>
           </a:p>
@@ -17793,7 +17793,7 @@
           <a:p>
             <a:r>
               <a:rPr lang="th-TH"/>
-              <a:t>2561.11.06</a:t>
+              <a:t>2562.10.25</a:t>
             </a:r>
             <a:endParaRPr lang="th-TH" dirty="0"/>
           </a:p>
@@ -18361,7 +18361,7 @@
           <a:p>
             <a:r>
               <a:rPr lang="th-TH"/>
-              <a:t>2561.11.06</a:t>
+              <a:t>2562.10.25</a:t>
             </a:r>
             <a:endParaRPr lang="th-TH" dirty="0"/>
           </a:p>
@@ -18966,7 +18966,7 @@
           <a:p>
             <a:r>
               <a:rPr lang="th-TH"/>
-              <a:t>2561.11.06</a:t>
+              <a:t>2562.10.25</a:t>
             </a:r>
             <a:endParaRPr lang="th-TH" dirty="0"/>
           </a:p>
@@ -19130,7 +19130,7 @@
           <a:p>
             <a:r>
               <a:rPr lang="th-TH"/>
-              <a:t>2561.11.06</a:t>
+              <a:t>2562.10.25</a:t>
             </a:r>
             <a:endParaRPr lang="th-TH" dirty="0"/>
           </a:p>
@@ -19536,7 +19536,7 @@
           <a:p>
             <a:r>
               <a:rPr lang="th-TH"/>
-              <a:t>2561.11.06</a:t>
+              <a:t>2562.10.25</a:t>
             </a:r>
             <a:endParaRPr lang="th-TH" dirty="0"/>
           </a:p>
@@ -19930,7 +19930,7 @@
           <a:p>
             <a:r>
               <a:rPr lang="th-TH"/>
-              <a:t>2561.11.06</a:t>
+              <a:t>2562.10.25</a:t>
             </a:r>
             <a:endParaRPr lang="th-TH" dirty="0"/>
           </a:p>
@@ -20279,7 +20279,7 @@
           <a:p>
             <a:r>
               <a:rPr lang="th-TH"/>
-              <a:t>2561.11.06</a:t>
+              <a:t>2562.10.25</a:t>
             </a:r>
             <a:endParaRPr lang="th-TH" dirty="0"/>
           </a:p>
@@ -20628,7 +20628,7 @@
           <a:p>
             <a:r>
               <a:rPr lang="th-TH"/>
-              <a:t>2561.11.06</a:t>
+              <a:t>2562.10.25</a:t>
             </a:r>
             <a:endParaRPr lang="th-TH" dirty="0"/>
           </a:p>
@@ -20902,7 +20902,7 @@
           <a:p>
             <a:r>
               <a:rPr lang="th-TH"/>
-              <a:t>2561.11.06</a:t>
+              <a:t>2562.10.25</a:t>
             </a:r>
             <a:endParaRPr lang="th-TH" dirty="0"/>
           </a:p>
@@ -21227,7 +21227,7 @@
           <a:p>
             <a:r>
               <a:rPr lang="th-TH"/>
-              <a:t>2561.11.06</a:t>
+              <a:t>2562.10.25</a:t>
             </a:r>
             <a:endParaRPr lang="th-TH" dirty="0"/>
           </a:p>
@@ -21423,7 +21423,7 @@
           <a:p>
             <a:r>
               <a:rPr lang="th-TH"/>
-              <a:t>2561.11.06</a:t>
+              <a:t>2562.10.25</a:t>
             </a:r>
             <a:endParaRPr lang="th-TH" dirty="0"/>
           </a:p>
@@ -21801,7 +21801,7 @@
           <a:p>
             <a:r>
               <a:rPr lang="th-TH"/>
-              <a:t>2561.11.06</a:t>
+              <a:t>2562.10.25</a:t>
             </a:r>
             <a:endParaRPr lang="th-TH" dirty="0"/>
           </a:p>
@@ -22049,7 +22049,7 @@
           <a:p>
             <a:r>
               <a:rPr lang="th-TH"/>
-              <a:t>2561.11.06</a:t>
+              <a:t>2562.10.25</a:t>
             </a:r>
             <a:endParaRPr lang="th-TH" dirty="0"/>
           </a:p>
@@ -22218,7 +22218,7 @@
           <a:p>
             <a:r>
               <a:rPr lang="th-TH"/>
-              <a:t>2561.11.06</a:t>
+              <a:t>2562.10.25</a:t>
             </a:r>
             <a:endParaRPr lang="th-TH" dirty="0"/>
           </a:p>
@@ -22712,7 +22712,7 @@
           <a:p>
             <a:r>
               <a:rPr lang="th-TH"/>
-              <a:t>2561.11.06</a:t>
+              <a:t>2562.10.25</a:t>
             </a:r>
             <a:endParaRPr lang="th-TH" dirty="0"/>
           </a:p>
@@ -22908,7 +22908,7 @@
           <a:p>
             <a:r>
               <a:rPr lang="th-TH"/>
-              <a:t>2561.11.06</a:t>
+              <a:t>2562.10.25</a:t>
             </a:r>
             <a:endParaRPr lang="th-TH" dirty="0"/>
           </a:p>
@@ -23327,7 +23327,7 @@
           <a:p>
             <a:r>
               <a:rPr lang="th-TH"/>
-              <a:t>2561.11.06</a:t>
+              <a:t>2562.10.25</a:t>
             </a:r>
             <a:endParaRPr lang="th-TH" dirty="0"/>
           </a:p>
@@ -23768,7 +23768,7 @@
           <a:p>
             <a:r>
               <a:rPr lang="th-TH"/>
-              <a:t>2561.11.06</a:t>
+              <a:t>2562.10.25</a:t>
             </a:r>
             <a:endParaRPr lang="th-TH" dirty="0"/>
           </a:p>
@@ -24106,7 +24106,7 @@
           <a:p>
             <a:r>
               <a:rPr lang="th-TH"/>
-              <a:t>2561.11.06</a:t>
+              <a:t>2562.10.25</a:t>
             </a:r>
             <a:endParaRPr lang="th-TH" dirty="0"/>
           </a:p>
@@ -24275,7 +24275,7 @@
           <a:p>
             <a:r>
               <a:rPr lang="th-TH"/>
-              <a:t>2561.11.06</a:t>
+              <a:t>2562.10.25</a:t>
             </a:r>
             <a:endParaRPr lang="th-TH" dirty="0"/>
           </a:p>
@@ -24596,7 +24596,7 @@
           <a:p>
             <a:r>
               <a:rPr lang="th-TH"/>
-              <a:t>2561.11.06</a:t>
+              <a:t>2562.10.25</a:t>
             </a:r>
             <a:endParaRPr lang="th-TH" dirty="0"/>
           </a:p>
@@ -24981,7 +24981,7 @@
           <a:p>
             <a:r>
               <a:rPr lang="th-TH"/>
-              <a:t>2561.11.06</a:t>
+              <a:t>2562.10.25</a:t>
             </a:r>
             <a:endParaRPr lang="th-TH" dirty="0"/>
           </a:p>
@@ -25355,7 +25355,7 @@
           <a:p>
             <a:r>
               <a:rPr lang="th-TH"/>
-              <a:t>2561.11.06</a:t>
+              <a:t>2562.10.25</a:t>
             </a:r>
             <a:endParaRPr lang="th-TH" dirty="0"/>
           </a:p>
@@ -25640,7 +25640,7 @@
           <a:p>
             <a:r>
               <a:rPr lang="th-TH"/>
-              <a:t>2561.11.06</a:t>
+              <a:t>2562.10.25</a:t>
             </a:r>
             <a:endParaRPr lang="th-TH" dirty="0"/>
           </a:p>
@@ -25920,7 +25920,7 @@
           <a:p>
             <a:r>
               <a:rPr lang="th-TH"/>
-              <a:t>2561.11.06</a:t>
+              <a:t>2562.10.25</a:t>
             </a:r>
             <a:endParaRPr lang="th-TH" dirty="0"/>
           </a:p>
@@ -26237,7 +26237,7 @@
           <a:p>
             <a:r>
               <a:rPr lang="th-TH"/>
-              <a:t>2561.11.06</a:t>
+              <a:t>2562.10.25</a:t>
             </a:r>
             <a:endParaRPr lang="th-TH" dirty="0"/>
           </a:p>
@@ -26406,7 +26406,7 @@
           <a:p>
             <a:r>
               <a:rPr lang="th-TH"/>
-              <a:t>2561.11.06</a:t>
+              <a:t>2562.10.25</a:t>
             </a:r>
             <a:endParaRPr lang="th-TH" dirty="0"/>
           </a:p>
@@ -26704,7 +26704,7 @@
           <a:p>
             <a:r>
               <a:rPr lang="th-TH"/>
-              <a:t>2561.11.06</a:t>
+              <a:t>2562.10.25</a:t>
             </a:r>
             <a:endParaRPr lang="th-TH" dirty="0"/>
           </a:p>
@@ -27047,7 +27047,7 @@
           <a:p>
             <a:r>
               <a:rPr lang="th-TH"/>
-              <a:t>2561.11.06</a:t>
+              <a:t>2562.10.25</a:t>
             </a:r>
             <a:endParaRPr lang="th-TH" dirty="0"/>
           </a:p>
@@ -27243,7 +27243,7 @@
           <a:p>
             <a:r>
               <a:rPr lang="th-TH"/>
-              <a:t>2561.11.06</a:t>
+              <a:t>2562.10.25</a:t>
             </a:r>
             <a:endParaRPr lang="th-TH" dirty="0"/>
           </a:p>
@@ -27636,7 +27636,7 @@
           <a:p>
             <a:r>
               <a:rPr lang="th-TH"/>
-              <a:t>2561.11.06</a:t>
+              <a:t>2562.10.25</a:t>
             </a:r>
             <a:endParaRPr lang="th-TH" dirty="0"/>
           </a:p>
@@ -27911,7 +27911,7 @@
           <a:p>
             <a:r>
               <a:rPr lang="th-TH"/>
-              <a:t>2561.11.06</a:t>
+              <a:t>2562.10.25</a:t>
             </a:r>
             <a:endParaRPr lang="th-TH" dirty="0"/>
           </a:p>
@@ -28164,7 +28164,7 @@
           <a:p>
             <a:r>
               <a:rPr lang="th-TH"/>
-              <a:t>2561.11.06</a:t>
+              <a:t>2562.10.25</a:t>
             </a:r>
             <a:endParaRPr lang="th-TH" dirty="0"/>
           </a:p>
@@ -28562,7 +28562,7 @@
           <a:p>
             <a:r>
               <a:rPr lang="th-TH"/>
-              <a:t>2561.11.06</a:t>
+              <a:t>2562.10.25</a:t>
             </a:r>
             <a:endParaRPr lang="th-TH" dirty="0"/>
           </a:p>
@@ -28892,7 +28892,7 @@
           <a:p>
             <a:r>
               <a:rPr lang="th-TH"/>
-              <a:t>2561.11.06</a:t>
+              <a:t>2562.10.25</a:t>
             </a:r>
             <a:endParaRPr lang="th-TH" dirty="0"/>
           </a:p>
@@ -29067,7 +29067,7 @@
           <a:p>
             <a:r>
               <a:rPr lang="th-TH"/>
-              <a:t>2561.11.06</a:t>
+              <a:t>2562.10.25</a:t>
             </a:r>
             <a:endParaRPr lang="th-TH" dirty="0"/>
           </a:p>
@@ -29263,7 +29263,7 @@
           <a:p>
             <a:r>
               <a:rPr lang="th-TH"/>
-              <a:t>2561.11.06</a:t>
+              <a:t>2562.10.25</a:t>
             </a:r>
             <a:endParaRPr lang="th-TH" dirty="0"/>
           </a:p>
@@ -29620,7 +29620,7 @@
           <a:p>
             <a:r>
               <a:rPr lang="th-TH"/>
-              <a:t>2561.11.06</a:t>
+              <a:t>2562.10.25</a:t>
             </a:r>
             <a:endParaRPr lang="th-TH" dirty="0"/>
           </a:p>
@@ -29930,7 +29930,7 @@
           <a:p>
             <a:r>
               <a:rPr lang="th-TH"/>
-              <a:t>2561.11.06</a:t>
+              <a:t>2562.10.25</a:t>
             </a:r>
             <a:endParaRPr lang="th-TH" dirty="0"/>
           </a:p>

</xml_diff>